<commit_message>
marked qnx explicit failures. this should conclude fixing all regression tests, but i will have to wait a few days for all regressions to re-run to confirm...
</commit_message>
<xml_diff>
--- a/BUGS.pptx
+++ b/BUGS.pptx
@@ -3051,7 +3051,7 @@
         </p:nvSpPr>
         <p:spPr>
           <a:xfrm>
-            <a:off x="3283527" y="847899"/>
+            <a:off x="3326475" y="727226"/>
             <a:ext cx="914400" cy="612648"/>
           </a:xfrm>
           <a:prstGeom prst="borderCallout1">
@@ -3470,8 +3470,17 @@
             <a:pPr algn="ctr"/>
             <a:r>
               <a:rPr lang="en-US" sz="1000" dirty="0" smtClean="0"/>
-              <a:t>GCC 8 new &amp; not released</a:t>
-            </a:r>
+              <a:t>GCC 8 new &amp; </a:t>
+            </a:r>
+            <a:r>
+              <a:rPr lang="en-US" sz="1000" dirty="0" smtClean="0"/>
+              <a:t>not yet </a:t>
+            </a:r>
+            <a:r>
+              <a:rPr lang="en-US" sz="1000" dirty="0" err="1" smtClean="0"/>
+              <a:t>rel</a:t>
+            </a:r>
+            <a:endParaRPr lang="en-US" sz="1000" dirty="0" smtClean="0"/>
           </a:p>
         </p:txBody>
       </p:sp>
@@ -3490,13 +3499,16 @@
             <a:avLst/>
           </a:prstGeom>
           <a:solidFill>
-            <a:srgbClr val="FF0000">
+            <a:schemeClr val="bg1">
+              <a:lumMod val="50000"/>
               <a:alpha val="50000"/>
-            </a:srgbClr>
+            </a:schemeClr>
           </a:solidFill>
           <a:ln>
             <a:solidFill>
-              <a:srgbClr val="FF0000"/>
+              <a:schemeClr val="bg1">
+                <a:lumMod val="50000"/>
+              </a:schemeClr>
             </a:solidFill>
           </a:ln>
         </p:spPr>
@@ -3545,11 +3557,15 @@
             </a:avLst>
           </a:prstGeom>
           <a:solidFill>
-            <a:srgbClr val="FF0000"/>
+            <a:schemeClr val="bg1">
+              <a:lumMod val="50000"/>
+            </a:schemeClr>
           </a:solidFill>
           <a:ln>
             <a:solidFill>
-              <a:srgbClr val="FF0000"/>
+              <a:schemeClr val="bg1">
+                <a:lumMod val="50000"/>
+              </a:schemeClr>
             </a:solidFill>
           </a:ln>
         </p:spPr>
@@ -3576,8 +3592,17 @@
             <a:pPr algn="ctr"/>
             <a:r>
               <a:rPr lang="en-US" sz="1000" dirty="0" smtClean="0"/>
-              <a:t>QNX</a:t>
-            </a:r>
+              <a:t>EXPECTED QNX </a:t>
+            </a:r>
+            <a:r>
+              <a:rPr lang="en-US" sz="1000" dirty="0" err="1" smtClean="0"/>
+              <a:t>un_ex</a:t>
+            </a:r>
+            <a:r>
+              <a:rPr lang="en-US" sz="1000" dirty="0" smtClean="0"/>
+              <a:t> always false</a:t>
+            </a:r>
+            <a:endParaRPr lang="en-US" sz="1000" dirty="0" smtClean="0"/>
           </a:p>
         </p:txBody>
       </p:sp>
@@ -3598,6 +3623,7 @@
           <a:solidFill>
             <a:schemeClr val="bg1">
               <a:lumMod val="50000"/>
+              <a:alpha val="50000"/>
             </a:schemeClr>
           </a:solidFill>
           <a:ln>
@@ -3738,6 +3764,7 @@
           <a:solidFill>
             <a:schemeClr val="bg1">
               <a:lumMod val="50000"/>
+              <a:alpha val="50000"/>
             </a:schemeClr>
           </a:solidFill>
           <a:ln>
@@ -3882,6 +3909,7 @@
           <a:solidFill>
             <a:schemeClr val="bg1">
               <a:lumMod val="50000"/>
+              <a:alpha val="50000"/>
             </a:schemeClr>
           </a:solidFill>
           <a:ln>
@@ -4087,7 +4115,6 @@
               <a:rPr lang="en-US" sz="1000" dirty="0" smtClean="0"/>
               <a:t>Nov 6</a:t>
             </a:r>
-            <a:endParaRPr lang="en-US" sz="1000" dirty="0" smtClean="0"/>
           </a:p>
           <a:p>
             <a:pPr algn="ctr"/>
@@ -4099,7 +4126,6 @@
               <a:rPr lang="en-US" sz="1000" dirty="0" smtClean="0"/>
               <a:t> (QNX)</a:t>
             </a:r>
-            <a:endParaRPr lang="en-US" sz="1000" dirty="0" smtClean="0"/>
           </a:p>
         </p:txBody>
       </p:sp>

</xml_diff>

<commit_message>
removed two expected failures that actually pass (the test runs were failing just because they were too old)
</commit_message>
<xml_diff>
--- a/BUGS.pptx
+++ b/BUGS.pptx
@@ -243,7 +243,7 @@
           <a:p>
             <a:fld id="{0FE7DDC7-E607-4B92-9E3F-A4DE506F9968}" type="datetimeFigureOut">
               <a:rPr lang="en-US" smtClean="0"/>
-              <a:t>11/11/2017</a:t>
+              <a:t>11/12/2017</a:t>
             </a:fld>
             <a:endParaRPr lang="en-US"/>
           </a:p>
@@ -413,7 +413,7 @@
           <a:p>
             <a:fld id="{0FE7DDC7-E607-4B92-9E3F-A4DE506F9968}" type="datetimeFigureOut">
               <a:rPr lang="en-US" smtClean="0"/>
-              <a:t>11/11/2017</a:t>
+              <a:t>11/12/2017</a:t>
             </a:fld>
             <a:endParaRPr lang="en-US"/>
           </a:p>
@@ -593,7 +593,7 @@
           <a:p>
             <a:fld id="{0FE7DDC7-E607-4B92-9E3F-A4DE506F9968}" type="datetimeFigureOut">
               <a:rPr lang="en-US" smtClean="0"/>
-              <a:t>11/11/2017</a:t>
+              <a:t>11/12/2017</a:t>
             </a:fld>
             <a:endParaRPr lang="en-US"/>
           </a:p>
@@ -763,7 +763,7 @@
           <a:p>
             <a:fld id="{0FE7DDC7-E607-4B92-9E3F-A4DE506F9968}" type="datetimeFigureOut">
               <a:rPr lang="en-US" smtClean="0"/>
-              <a:t>11/11/2017</a:t>
+              <a:t>11/12/2017</a:t>
             </a:fld>
             <a:endParaRPr lang="en-US"/>
           </a:p>
@@ -1009,7 +1009,7 @@
           <a:p>
             <a:fld id="{0FE7DDC7-E607-4B92-9E3F-A4DE506F9968}" type="datetimeFigureOut">
               <a:rPr lang="en-US" smtClean="0"/>
-              <a:t>11/11/2017</a:t>
+              <a:t>11/12/2017</a:t>
             </a:fld>
             <a:endParaRPr lang="en-US"/>
           </a:p>
@@ -1241,7 +1241,7 @@
           <a:p>
             <a:fld id="{0FE7DDC7-E607-4B92-9E3F-A4DE506F9968}" type="datetimeFigureOut">
               <a:rPr lang="en-US" smtClean="0"/>
-              <a:t>11/11/2017</a:t>
+              <a:t>11/12/2017</a:t>
             </a:fld>
             <a:endParaRPr lang="en-US"/>
           </a:p>
@@ -1608,7 +1608,7 @@
           <a:p>
             <a:fld id="{0FE7DDC7-E607-4B92-9E3F-A4DE506F9968}" type="datetimeFigureOut">
               <a:rPr lang="en-US" smtClean="0"/>
-              <a:t>11/11/2017</a:t>
+              <a:t>11/12/2017</a:t>
             </a:fld>
             <a:endParaRPr lang="en-US"/>
           </a:p>
@@ -1726,7 +1726,7 @@
           <a:p>
             <a:fld id="{0FE7DDC7-E607-4B92-9E3F-A4DE506F9968}" type="datetimeFigureOut">
               <a:rPr lang="en-US" smtClean="0"/>
-              <a:t>11/11/2017</a:t>
+              <a:t>11/12/2017</a:t>
             </a:fld>
             <a:endParaRPr lang="en-US"/>
           </a:p>
@@ -1821,7 +1821,7 @@
           <a:p>
             <a:fld id="{0FE7DDC7-E607-4B92-9E3F-A4DE506F9968}" type="datetimeFigureOut">
               <a:rPr lang="en-US" smtClean="0"/>
-              <a:t>11/11/2017</a:t>
+              <a:t>11/12/2017</a:t>
             </a:fld>
             <a:endParaRPr lang="en-US"/>
           </a:p>
@@ -2098,7 +2098,7 @@
           <a:p>
             <a:fld id="{0FE7DDC7-E607-4B92-9E3F-A4DE506F9968}" type="datetimeFigureOut">
               <a:rPr lang="en-US" smtClean="0"/>
-              <a:t>11/11/2017</a:t>
+              <a:t>11/12/2017</a:t>
             </a:fld>
             <a:endParaRPr lang="en-US"/>
           </a:p>
@@ -2351,7 +2351,7 @@
           <a:p>
             <a:fld id="{0FE7DDC7-E607-4B92-9E3F-A4DE506F9968}" type="datetimeFigureOut">
               <a:rPr lang="en-US" smtClean="0"/>
-              <a:t>11/11/2017</a:t>
+              <a:t>11/12/2017</a:t>
             </a:fld>
             <a:endParaRPr lang="en-US"/>
           </a:p>
@@ -2564,7 +2564,7 @@
           <a:p>
             <a:fld id="{0FE7DDC7-E607-4B92-9E3F-A4DE506F9968}" type="datetimeFigureOut">
               <a:rPr lang="en-US" smtClean="0"/>
-              <a:t>11/11/2017</a:t>
+              <a:t>11/12/2017</a:t>
             </a:fld>
             <a:endParaRPr lang="en-US"/>
           </a:p>
@@ -2991,6 +2991,16 @@
           <a:prstGeom prst="rect">
             <a:avLst/>
           </a:prstGeom>
+          <a:solidFill>
+            <a:srgbClr val="00B050">
+              <a:alpha val="50000"/>
+            </a:srgbClr>
+          </a:solidFill>
+          <a:ln>
+            <a:solidFill>
+              <a:srgbClr val="00B050"/>
+            </a:solidFill>
+          </a:ln>
         </p:spPr>
       </p:pic>
       <p:sp>
@@ -3008,13 +3018,13 @@
             <a:avLst/>
           </a:prstGeom>
           <a:solidFill>
-            <a:schemeClr val="tx1">
+            <a:srgbClr val="FF0000">
               <a:alpha val="50000"/>
-            </a:schemeClr>
+            </a:srgbClr>
           </a:solidFill>
           <a:ln>
             <a:solidFill>
-              <a:schemeClr val="tx1"/>
+              <a:srgbClr val="FF0000"/>
             </a:solidFill>
           </a:ln>
         </p:spPr>
@@ -3063,11 +3073,11 @@
             </a:avLst>
           </a:prstGeom>
           <a:solidFill>
-            <a:schemeClr val="tx1"/>
+            <a:srgbClr val="FF0000"/>
           </a:solidFill>
           <a:ln>
             <a:solidFill>
-              <a:schemeClr val="tx1"/>
+              <a:srgbClr val="FF0000"/>
             </a:solidFill>
           </a:ln>
         </p:spPr>
@@ -3094,23 +3104,24 @@
             <a:pPr algn="ctr"/>
             <a:r>
               <a:rPr lang="en-US" sz="1000" dirty="0" smtClean="0"/>
-              <a:t>OLD</a:t>
+              <a:t>_NOEXCEPT error in &lt;</a:t>
+            </a:r>
+            <a:r>
+              <a:rPr lang="en-US" sz="1000" dirty="0" err="1" smtClean="0"/>
+              <a:t>ostream</a:t>
+            </a:r>
+            <a:r>
+              <a:rPr lang="en-US" sz="1000" dirty="0" smtClean="0"/>
+              <a:t>&gt;</a:t>
             </a:r>
           </a:p>
           <a:p>
             <a:pPr algn="ctr"/>
             <a:r>
               <a:rPr lang="en-US" sz="1000" dirty="0" smtClean="0"/>
-              <a:t>Nov 4</a:t>
-            </a:r>
-          </a:p>
-          <a:p>
-            <a:pPr algn="ctr"/>
-            <a:r>
-              <a:rPr lang="en-US" sz="1000" dirty="0" smtClean="0"/>
-              <a:t>_NOEXCEPT</a:t>
-            </a:r>
-            <a:endParaRPr lang="en-US" sz="1000" dirty="0"/>
+              <a:t>Asked boost…</a:t>
+            </a:r>
+            <a:endParaRPr lang="en-US" sz="1000" dirty="0" smtClean="0"/>
           </a:p>
         </p:txBody>
       </p:sp>
@@ -3470,11 +3481,7 @@
             <a:pPr algn="ctr"/>
             <a:r>
               <a:rPr lang="en-US" sz="1000" dirty="0" smtClean="0"/>
-              <a:t>GCC 8 new &amp; </a:t>
-            </a:r>
-            <a:r>
-              <a:rPr lang="en-US" sz="1000" dirty="0" smtClean="0"/>
-              <a:t>not yet </a:t>
+              <a:t>GCC 8 new &amp; not yet </a:t>
             </a:r>
             <a:r>
               <a:rPr lang="en-US" sz="1000" dirty="0" err="1" smtClean="0"/>
@@ -3602,7 +3609,6 @@
               <a:rPr lang="en-US" sz="1000" dirty="0" smtClean="0"/>
               <a:t> always false</a:t>
             </a:r>
-            <a:endParaRPr lang="en-US" sz="1000" dirty="0" smtClean="0"/>
           </a:p>
         </p:txBody>
       </p:sp>
@@ -3762,16 +3768,13 @@
             <a:avLst/>
           </a:prstGeom>
           <a:solidFill>
-            <a:schemeClr val="bg1">
-              <a:lumMod val="50000"/>
+            <a:srgbClr val="00B050">
               <a:alpha val="50000"/>
-            </a:schemeClr>
+            </a:srgbClr>
           </a:solidFill>
           <a:ln>
             <a:solidFill>
-              <a:schemeClr val="bg1">
-                <a:lumMod val="50000"/>
-              </a:schemeClr>
+              <a:srgbClr val="00B050"/>
             </a:solidFill>
           </a:ln>
         </p:spPr>
@@ -3820,15 +3823,11 @@
             </a:avLst>
           </a:prstGeom>
           <a:solidFill>
-            <a:schemeClr val="bg1">
-              <a:lumMod val="50000"/>
-            </a:schemeClr>
+            <a:srgbClr val="00B050"/>
           </a:solidFill>
           <a:ln>
             <a:solidFill>
-              <a:schemeClr val="bg1">
-                <a:lumMod val="50000"/>
-              </a:schemeClr>
+              <a:srgbClr val="00B050"/>
             </a:solidFill>
           </a:ln>
         </p:spPr>
@@ -3855,38 +3854,14 @@
             <a:pPr algn="ctr"/>
             <a:r>
               <a:rPr lang="en-US" sz="1000" dirty="0" smtClean="0"/>
-              <a:t>EXPECTED</a:t>
+              <a:t>OK</a:t>
             </a:r>
           </a:p>
           <a:p>
             <a:pPr algn="ctr"/>
             <a:r>
-              <a:rPr lang="en-US" sz="1000" dirty="0"/>
-              <a:t>n</a:t>
-            </a:r>
-            <a:r>
               <a:rPr lang="en-US" sz="1000" dirty="0" smtClean="0"/>
-              <a:t>o </a:t>
-            </a:r>
-            <a:r>
-              <a:rPr lang="en-US" sz="1000" dirty="0" err="1" smtClean="0"/>
-              <a:t>mingw</a:t>
-            </a:r>
-            <a:r>
-              <a:rPr lang="en-US" sz="1000" dirty="0" smtClean="0"/>
-              <a:t> </a:t>
-            </a:r>
-            <a:r>
-              <a:rPr lang="en-US" sz="1000" dirty="0" err="1" smtClean="0"/>
-              <a:t>gcc</a:t>
-            </a:r>
-            <a:r>
-              <a:rPr lang="en-US" sz="1000" dirty="0" smtClean="0"/>
-              <a:t> 5.1 </a:t>
-            </a:r>
-            <a:r>
-              <a:rPr lang="en-US" sz="1000" dirty="0" err="1" smtClean="0"/>
-              <a:t>rel</a:t>
+              <a:t>Fixed itself in Nov 12 re-run</a:t>
             </a:r>
             <a:endParaRPr lang="en-US" sz="1000" dirty="0" smtClean="0"/>
           </a:p>

</xml_diff>

<commit_message>
finished to mark all expected failures. started to review docs
</commit_message>
<xml_diff>
--- a/BUGS.pptx
+++ b/BUGS.pptx
@@ -243,7 +243,7 @@
           <a:p>
             <a:fld id="{0FE7DDC7-E607-4B92-9E3F-A4DE506F9968}" type="datetimeFigureOut">
               <a:rPr lang="en-US" smtClean="0"/>
-              <a:t>11/12/2017</a:t>
+              <a:t>11/15/2017</a:t>
             </a:fld>
             <a:endParaRPr lang="en-US"/>
           </a:p>
@@ -413,7 +413,7 @@
           <a:p>
             <a:fld id="{0FE7DDC7-E607-4B92-9E3F-A4DE506F9968}" type="datetimeFigureOut">
               <a:rPr lang="en-US" smtClean="0"/>
-              <a:t>11/12/2017</a:t>
+              <a:t>11/15/2017</a:t>
             </a:fld>
             <a:endParaRPr lang="en-US"/>
           </a:p>
@@ -593,7 +593,7 @@
           <a:p>
             <a:fld id="{0FE7DDC7-E607-4B92-9E3F-A4DE506F9968}" type="datetimeFigureOut">
               <a:rPr lang="en-US" smtClean="0"/>
-              <a:t>11/12/2017</a:t>
+              <a:t>11/15/2017</a:t>
             </a:fld>
             <a:endParaRPr lang="en-US"/>
           </a:p>
@@ -763,7 +763,7 @@
           <a:p>
             <a:fld id="{0FE7DDC7-E607-4B92-9E3F-A4DE506F9968}" type="datetimeFigureOut">
               <a:rPr lang="en-US" smtClean="0"/>
-              <a:t>11/12/2017</a:t>
+              <a:t>11/15/2017</a:t>
             </a:fld>
             <a:endParaRPr lang="en-US"/>
           </a:p>
@@ -1009,7 +1009,7 @@
           <a:p>
             <a:fld id="{0FE7DDC7-E607-4B92-9E3F-A4DE506F9968}" type="datetimeFigureOut">
               <a:rPr lang="en-US" smtClean="0"/>
-              <a:t>11/12/2017</a:t>
+              <a:t>11/15/2017</a:t>
             </a:fld>
             <a:endParaRPr lang="en-US"/>
           </a:p>
@@ -1241,7 +1241,7 @@
           <a:p>
             <a:fld id="{0FE7DDC7-E607-4B92-9E3F-A4DE506F9968}" type="datetimeFigureOut">
               <a:rPr lang="en-US" smtClean="0"/>
-              <a:t>11/12/2017</a:t>
+              <a:t>11/15/2017</a:t>
             </a:fld>
             <a:endParaRPr lang="en-US"/>
           </a:p>
@@ -1608,7 +1608,7 @@
           <a:p>
             <a:fld id="{0FE7DDC7-E607-4B92-9E3F-A4DE506F9968}" type="datetimeFigureOut">
               <a:rPr lang="en-US" smtClean="0"/>
-              <a:t>11/12/2017</a:t>
+              <a:t>11/15/2017</a:t>
             </a:fld>
             <a:endParaRPr lang="en-US"/>
           </a:p>
@@ -1726,7 +1726,7 @@
           <a:p>
             <a:fld id="{0FE7DDC7-E607-4B92-9E3F-A4DE506F9968}" type="datetimeFigureOut">
               <a:rPr lang="en-US" smtClean="0"/>
-              <a:t>11/12/2017</a:t>
+              <a:t>11/15/2017</a:t>
             </a:fld>
             <a:endParaRPr lang="en-US"/>
           </a:p>
@@ -1821,7 +1821,7 @@
           <a:p>
             <a:fld id="{0FE7DDC7-E607-4B92-9E3F-A4DE506F9968}" type="datetimeFigureOut">
               <a:rPr lang="en-US" smtClean="0"/>
-              <a:t>11/12/2017</a:t>
+              <a:t>11/15/2017</a:t>
             </a:fld>
             <a:endParaRPr lang="en-US"/>
           </a:p>
@@ -2098,7 +2098,7 @@
           <a:p>
             <a:fld id="{0FE7DDC7-E607-4B92-9E3F-A4DE506F9968}" type="datetimeFigureOut">
               <a:rPr lang="en-US" smtClean="0"/>
-              <a:t>11/12/2017</a:t>
+              <a:t>11/15/2017</a:t>
             </a:fld>
             <a:endParaRPr lang="en-US"/>
           </a:p>
@@ -2351,7 +2351,7 @@
           <a:p>
             <a:fld id="{0FE7DDC7-E607-4B92-9E3F-A4DE506F9968}" type="datetimeFigureOut">
               <a:rPr lang="en-US" smtClean="0"/>
-              <a:t>11/12/2017</a:t>
+              <a:t>11/15/2017</a:t>
             </a:fld>
             <a:endParaRPr lang="en-US"/>
           </a:p>
@@ -2564,7 +2564,7 @@
           <a:p>
             <a:fld id="{0FE7DDC7-E607-4B92-9E3F-A4DE506F9968}" type="datetimeFigureOut">
               <a:rPr lang="en-US" smtClean="0"/>
-              <a:t>11/12/2017</a:t>
+              <a:t>11/15/2017</a:t>
             </a:fld>
             <a:endParaRPr lang="en-US"/>
           </a:p>
@@ -3121,7 +3121,6 @@
               <a:rPr lang="en-US" sz="1000" dirty="0" smtClean="0"/>
               <a:t>Asked boost…</a:t>
             </a:r>
-            <a:endParaRPr lang="en-US" sz="1000" dirty="0" smtClean="0"/>
           </a:p>
         </p:txBody>
       </p:sp>
@@ -3140,13 +3139,13 @@
             <a:avLst/>
           </a:prstGeom>
           <a:solidFill>
-            <a:schemeClr val="tx1">
+            <a:srgbClr val="00B050">
               <a:alpha val="50000"/>
-            </a:schemeClr>
+            </a:srgbClr>
           </a:solidFill>
           <a:ln>
             <a:solidFill>
-              <a:schemeClr val="tx1"/>
+              <a:srgbClr val="00B050"/>
             </a:solidFill>
           </a:ln>
         </p:spPr>
@@ -3195,11 +3194,13 @@
             </a:avLst>
           </a:prstGeom>
           <a:solidFill>
-            <a:schemeClr val="tx1"/>
+            <a:srgbClr val="00B050">
+              <a:alpha val="50000"/>
+            </a:srgbClr>
           </a:solidFill>
           <a:ln>
             <a:solidFill>
-              <a:schemeClr val="tx1"/>
+              <a:srgbClr val="00B050"/>
             </a:solidFill>
           </a:ln>
         </p:spPr>
@@ -3226,23 +3227,16 @@
             <a:pPr algn="ctr"/>
             <a:r>
               <a:rPr lang="en-US" sz="1000" dirty="0" smtClean="0"/>
-              <a:t>OLD</a:t>
+              <a:t>OK</a:t>
             </a:r>
           </a:p>
           <a:p>
             <a:pPr algn="ctr"/>
             <a:r>
               <a:rPr lang="en-US" sz="1000" dirty="0" smtClean="0"/>
-              <a:t>Nov 5-6</a:t>
-            </a:r>
-          </a:p>
-          <a:p>
-            <a:pPr algn="ctr"/>
-            <a:r>
-              <a:rPr lang="en-US" sz="1000" dirty="0" err="1" smtClean="0"/>
-              <a:t>Boost.Optional</a:t>
-            </a:r>
-            <a:endParaRPr lang="en-US" sz="1000" dirty="0"/>
+              <a:t>It was OLD</a:t>
+            </a:r>
+            <a:endParaRPr lang="en-US" sz="1000" dirty="0" smtClean="0"/>
           </a:p>
         </p:txBody>
       </p:sp>
@@ -3863,7 +3857,6 @@
               <a:rPr lang="en-US" sz="1000" dirty="0" smtClean="0"/>
               <a:t>Fixed itself in Nov 12 re-run</a:t>
             </a:r>
-            <a:endParaRPr lang="en-US" sz="1000" dirty="0" smtClean="0"/>
           </a:p>
         </p:txBody>
       </p:sp>

</xml_diff>